<commit_message>
first simulation of betting
Signed-off-by: Simone90SSL <simone_ro@hotmail.it>
</commit_message>
<xml_diff>
--- a/TODO/spa_presentation.pptx
+++ b/TODO/spa_presentation.pptx
@@ -12758,15 +12758,7 @@
             </a:r>
             <a:r>
               <a:rPr lang="en-GB" dirty="0" smtClean="0"/>
-              <a:t>comparable with </a:t>
-            </a:r>
-            <a:r>
-              <a:rPr lang="en-GB" smtClean="0"/>
-              <a:t>the one’s from bigger </a:t>
-            </a:r>
-            <a:r>
-              <a:rPr lang="en-GB" dirty="0" smtClean="0"/>
-              <a:t>(N vs n, N &gt;&gt; n ).</a:t>
+              <a:t>comparable with the one’s from bigger (N vs n, N &gt;&gt; n ).</a:t>
             </a:r>
             <a:endParaRPr lang="en-GB" dirty="0"/>
           </a:p>

</xml_diff>

<commit_message>
caching of prediciton in the GUI
Signed-off-by: Simone90SSL <simone_ro@hotmail.it>
</commit_message>
<xml_diff>
--- a/TODO/spa_presentation.pptx
+++ b/TODO/spa_presentation.pptx
@@ -5,7 +5,7 @@
     <p:sldMasterId id="2147483713" r:id="rId1"/>
   </p:sldMasterIdLst>
   <p:notesMasterIdLst>
-    <p:notesMasterId r:id="rId13"/>
+    <p:notesMasterId r:id="rId14"/>
   </p:notesMasterIdLst>
   <p:sldIdLst>
     <p:sldId id="256" r:id="rId2"/>
@@ -18,7 +18,8 @@
     <p:sldId id="264" r:id="rId9"/>
     <p:sldId id="265" r:id="rId10"/>
     <p:sldId id="266" r:id="rId11"/>
-    <p:sldId id="263" r:id="rId12"/>
+    <p:sldId id="267" r:id="rId12"/>
+    <p:sldId id="263" r:id="rId13"/>
   </p:sldIdLst>
   <p:sldSz cx="12192000" cy="6858000"/>
   <p:notesSz cx="6858000" cy="9144000"/>
@@ -539,11 +540,11 @@
         </c:dLbls>
         <c:gapWidth val="219"/>
         <c:overlap val="-27"/>
-        <c:axId val="-1106739488"/>
-        <c:axId val="-1106737712"/>
+        <c:axId val="1999587920"/>
+        <c:axId val="1999589696"/>
       </c:barChart>
       <c:catAx>
-        <c:axId val="-1106739488"/>
+        <c:axId val="1999587920"/>
         <c:scaling>
           <c:orientation val="minMax"/>
         </c:scaling>
@@ -586,7 +587,7 @@
             <a:endParaRPr lang="en-US"/>
           </a:p>
         </c:txPr>
-        <c:crossAx val="-1106737712"/>
+        <c:crossAx val="1999589696"/>
         <c:crosses val="autoZero"/>
         <c:auto val="1"/>
         <c:lblAlgn val="ctr"/>
@@ -594,7 +595,7 @@
         <c:noMultiLvlLbl val="0"/>
       </c:catAx>
       <c:valAx>
-        <c:axId val="-1106737712"/>
+        <c:axId val="1999589696"/>
         <c:scaling>
           <c:orientation val="minMax"/>
         </c:scaling>
@@ -645,7 +646,7 @@
             <a:endParaRPr lang="en-US"/>
           </a:p>
         </c:txPr>
-        <c:crossAx val="-1106739488"/>
+        <c:crossAx val="1999587920"/>
         <c:crosses val="autoZero"/>
         <c:crossBetween val="between"/>
       </c:valAx>
@@ -1098,11 +1099,11 @@
         </c:dLbls>
         <c:gapWidth val="219"/>
         <c:overlap val="-27"/>
-        <c:axId val="-1056897408"/>
-        <c:axId val="-1056756000"/>
+        <c:axId val="1999610560"/>
+        <c:axId val="1999613312"/>
       </c:barChart>
       <c:catAx>
-        <c:axId val="-1056897408"/>
+        <c:axId val="1999610560"/>
         <c:scaling>
           <c:orientation val="minMax"/>
         </c:scaling>
@@ -1145,7 +1146,7 @@
             <a:endParaRPr lang="en-US"/>
           </a:p>
         </c:txPr>
-        <c:crossAx val="-1056756000"/>
+        <c:crossAx val="1999613312"/>
         <c:crosses val="autoZero"/>
         <c:auto val="1"/>
         <c:lblAlgn val="ctr"/>
@@ -1153,7 +1154,7 @@
         <c:noMultiLvlLbl val="0"/>
       </c:catAx>
       <c:valAx>
-        <c:axId val="-1056756000"/>
+        <c:axId val="1999613312"/>
         <c:scaling>
           <c:orientation val="minMax"/>
         </c:scaling>
@@ -1204,7 +1205,7 @@
             <a:endParaRPr lang="en-US"/>
           </a:p>
         </c:txPr>
-        <c:crossAx val="-1056897408"/>
+        <c:crossAx val="1999610560"/>
         <c:crosses val="autoZero"/>
         <c:crossBetween val="between"/>
       </c:valAx>
@@ -1657,11 +1658,11 @@
         </c:dLbls>
         <c:gapWidth val="219"/>
         <c:overlap val="-27"/>
-        <c:axId val="-1056814672"/>
-        <c:axId val="-1056812352"/>
+        <c:axId val="2021674176"/>
+        <c:axId val="2021676928"/>
       </c:barChart>
       <c:catAx>
-        <c:axId val="-1056814672"/>
+        <c:axId val="2021674176"/>
         <c:scaling>
           <c:orientation val="minMax"/>
         </c:scaling>
@@ -1704,7 +1705,7 @@
             <a:endParaRPr lang="en-US"/>
           </a:p>
         </c:txPr>
-        <c:crossAx val="-1056812352"/>
+        <c:crossAx val="2021676928"/>
         <c:crosses val="autoZero"/>
         <c:auto val="1"/>
         <c:lblAlgn val="ctr"/>
@@ -1712,7 +1713,7 @@
         <c:noMultiLvlLbl val="0"/>
       </c:catAx>
       <c:valAx>
-        <c:axId val="-1056812352"/>
+        <c:axId val="2021676928"/>
         <c:scaling>
           <c:orientation val="minMax"/>
         </c:scaling>
@@ -1763,7 +1764,7 @@
             <a:endParaRPr lang="en-US"/>
           </a:p>
         </c:txPr>
-        <c:crossAx val="-1056814672"/>
+        <c:crossAx val="2021674176"/>
         <c:crosses val="autoZero"/>
         <c:crossBetween val="between"/>
       </c:valAx>
@@ -1807,6 +1808,854 @@
         </a:p>
       </c:txPr>
     </c:legend>
+    <c:plotVisOnly val="1"/>
+    <c:dispBlanksAs val="gap"/>
+    <c:showDLblsOverMax val="0"/>
+  </c:chart>
+  <c:spPr>
+    <a:noFill/>
+    <a:ln>
+      <a:noFill/>
+    </a:ln>
+    <a:effectLst/>
+  </c:spPr>
+  <c:txPr>
+    <a:bodyPr/>
+    <a:lstStyle/>
+    <a:p>
+      <a:pPr>
+        <a:defRPr/>
+      </a:pPr>
+      <a:endParaRPr lang="en-US"/>
+    </a:p>
+  </c:txPr>
+  <c:externalData r:id="rId3">
+    <c:autoUpdate val="0"/>
+  </c:externalData>
+</c:chartSpace>
+</file>
+
+<file path=ppt/charts/chart4.xml><?xml version="1.0" encoding="utf-8"?>
+<c:chartSpace xmlns:c="http://schemas.openxmlformats.org/drawingml/2006/chart" xmlns:a="http://schemas.openxmlformats.org/drawingml/2006/main" xmlns:r="http://schemas.openxmlformats.org/officeDocument/2006/relationships">
+  <c:date1904 val="0"/>
+  <c:lang val="en-US"/>
+  <c:roundedCorners val="0"/>
+  <mc:AlternateContent xmlns:mc="http://schemas.openxmlformats.org/markup-compatibility/2006">
+    <mc:Choice xmlns:c14="http://schemas.microsoft.com/office/drawing/2007/8/2/chart" Requires="c14">
+      <c14:style val="102"/>
+    </mc:Choice>
+    <mc:Fallback>
+      <c:style val="2"/>
+    </mc:Fallback>
+  </mc:AlternateContent>
+  <c:chart>
+    <c:title>
+      <c:tx>
+        <c:rich>
+          <a:bodyPr rot="0" spcFirstLastPara="1" vertOverflow="ellipsis" vert="horz" wrap="square" anchor="ctr" anchorCtr="1"/>
+          <a:lstStyle/>
+          <a:p>
+            <a:pPr>
+              <a:defRPr sz="1400" b="0" i="0" u="none" strike="noStrike" kern="1200" spc="0" baseline="0">
+                <a:solidFill>
+                  <a:schemeClr val="tx1">
+                    <a:lumMod val="65000"/>
+                    <a:lumOff val="35000"/>
+                  </a:schemeClr>
+                </a:solidFill>
+                <a:latin typeface="+mn-lt"/>
+                <a:ea typeface="+mn-ea"/>
+                <a:cs typeface="+mn-cs"/>
+              </a:defRPr>
+            </a:pPr>
+            <a:r>
+              <a:rPr lang="en-US" dirty="0" smtClean="0"/>
+              <a:t>Accuracy</a:t>
+            </a:r>
+            <a:r>
+              <a:rPr lang="en-US" baseline="0" dirty="0" smtClean="0"/>
+              <a:t> comparison</a:t>
+            </a:r>
+            <a:endParaRPr lang="en-US" dirty="0"/>
+          </a:p>
+        </c:rich>
+      </c:tx>
+      <c:layout/>
+      <c:overlay val="0"/>
+      <c:spPr>
+        <a:noFill/>
+        <a:ln>
+          <a:noFill/>
+        </a:ln>
+        <a:effectLst/>
+      </c:spPr>
+      <c:txPr>
+        <a:bodyPr rot="0" spcFirstLastPara="1" vertOverflow="ellipsis" vert="horz" wrap="square" anchor="ctr" anchorCtr="1"/>
+        <a:lstStyle/>
+        <a:p>
+          <a:pPr>
+            <a:defRPr sz="1400" b="0" i="0" u="none" strike="noStrike" kern="1200" spc="0" baseline="0">
+              <a:solidFill>
+                <a:schemeClr val="tx1">
+                  <a:lumMod val="65000"/>
+                  <a:lumOff val="35000"/>
+                </a:schemeClr>
+              </a:solidFill>
+              <a:latin typeface="+mn-lt"/>
+              <a:ea typeface="+mn-ea"/>
+              <a:cs typeface="+mn-cs"/>
+            </a:defRPr>
+          </a:pPr>
+          <a:endParaRPr lang="en-US"/>
+        </a:p>
+      </c:txPr>
+    </c:title>
+    <c:autoTitleDeleted val="0"/>
+    <c:plotArea>
+      <c:layout>
+        <c:manualLayout>
+          <c:layoutTarget val="inner"/>
+          <c:xMode val="edge"/>
+          <c:yMode val="edge"/>
+          <c:x val="0.0939835786559934"/>
+          <c:y val="0.20737555434881"/>
+          <c:w val="0.864349737532808"/>
+          <c:h val="0.697916779799077"/>
+        </c:manualLayout>
+      </c:layout>
+      <c:barChart>
+        <c:barDir val="col"/>
+        <c:grouping val="clustered"/>
+        <c:varyColors val="0"/>
+        <c:ser>
+          <c:idx val="0"/>
+          <c:order val="0"/>
+          <c:tx>
+            <c:strRef>
+              <c:f>BEST!$A$4:$C$4</c:f>
+              <c:strCache>
+                <c:ptCount val="3"/>
+                <c:pt idx="0">
+                  <c:v>1_3</c:v>
+                </c:pt>
+                <c:pt idx="1">
+                  <c:v>35</c:v>
+                </c:pt>
+                <c:pt idx="2">
+                  <c:v>Sklearn_SVM</c:v>
+                </c:pt>
+              </c:strCache>
+            </c:strRef>
+          </c:tx>
+          <c:spPr>
+            <a:solidFill>
+              <a:schemeClr val="accent1"/>
+            </a:solidFill>
+            <a:ln>
+              <a:noFill/>
+            </a:ln>
+            <a:effectLst/>
+          </c:spPr>
+          <c:invertIfNegative val="0"/>
+          <c:val>
+            <c:numRef>
+              <c:f>BEST!$G$4</c:f>
+              <c:numCache>
+                <c:formatCode>General</c:formatCode>
+                <c:ptCount val="1"/>
+                <c:pt idx="0">
+                  <c:v>0.489</c:v>
+                </c:pt>
+              </c:numCache>
+            </c:numRef>
+          </c:val>
+        </c:ser>
+        <c:ser>
+          <c:idx val="1"/>
+          <c:order val="1"/>
+          <c:tx>
+            <c:strRef>
+              <c:f>BEST!$A$8:$C$8</c:f>
+              <c:strCache>
+                <c:ptCount val="3"/>
+                <c:pt idx="0">
+                  <c:v>2_3</c:v>
+                </c:pt>
+                <c:pt idx="1">
+                  <c:v>19</c:v>
+                </c:pt>
+                <c:pt idx="2">
+                  <c:v>Sklearn_SVM</c:v>
+                </c:pt>
+              </c:strCache>
+            </c:strRef>
+          </c:tx>
+          <c:spPr>
+            <a:solidFill>
+              <a:schemeClr val="accent2"/>
+            </a:solidFill>
+            <a:ln>
+              <a:noFill/>
+            </a:ln>
+            <a:effectLst/>
+          </c:spPr>
+          <c:invertIfNegative val="0"/>
+          <c:val>
+            <c:numRef>
+              <c:f>BEST!$G$8</c:f>
+              <c:numCache>
+                <c:formatCode>General</c:formatCode>
+                <c:ptCount val="1"/>
+                <c:pt idx="0">
+                  <c:v>0.475</c:v>
+                </c:pt>
+              </c:numCache>
+            </c:numRef>
+          </c:val>
+        </c:ser>
+        <c:ser>
+          <c:idx val="2"/>
+          <c:order val="2"/>
+          <c:tx>
+            <c:strRef>
+              <c:f>BEST!$A$10:$C$10</c:f>
+              <c:strCache>
+                <c:ptCount val="3"/>
+                <c:pt idx="0">
+                  <c:v>3</c:v>
+                </c:pt>
+                <c:pt idx="1">
+                  <c:v>71</c:v>
+                </c:pt>
+                <c:pt idx="2">
+                  <c:v>Sklearn_SVM</c:v>
+                </c:pt>
+              </c:strCache>
+            </c:strRef>
+          </c:tx>
+          <c:spPr>
+            <a:solidFill>
+              <a:schemeClr val="accent3"/>
+            </a:solidFill>
+            <a:ln>
+              <a:noFill/>
+            </a:ln>
+            <a:effectLst/>
+          </c:spPr>
+          <c:invertIfNegative val="0"/>
+          <c:val>
+            <c:numRef>
+              <c:f>BEST!$G$10</c:f>
+              <c:numCache>
+                <c:formatCode>General</c:formatCode>
+                <c:ptCount val="1"/>
+                <c:pt idx="0">
+                  <c:v>0.477</c:v>
+                </c:pt>
+              </c:numCache>
+            </c:numRef>
+          </c:val>
+        </c:ser>
+        <c:ser>
+          <c:idx val="3"/>
+          <c:order val="3"/>
+          <c:tx>
+            <c:strRef>
+              <c:f>BEST!$A$12:$C$12</c:f>
+              <c:strCache>
+                <c:ptCount val="3"/>
+                <c:pt idx="0">
+                  <c:v>5</c:v>
+                </c:pt>
+                <c:pt idx="1">
+                  <c:v>19</c:v>
+                </c:pt>
+                <c:pt idx="2">
+                  <c:v>my_poisson</c:v>
+                </c:pt>
+              </c:strCache>
+            </c:strRef>
+          </c:tx>
+          <c:spPr>
+            <a:solidFill>
+              <a:schemeClr val="accent4"/>
+            </a:solidFill>
+            <a:ln>
+              <a:noFill/>
+            </a:ln>
+            <a:effectLst/>
+          </c:spPr>
+          <c:invertIfNegative val="0"/>
+          <c:val>
+            <c:numRef>
+              <c:f>BEST!$G$12</c:f>
+              <c:numCache>
+                <c:formatCode>General</c:formatCode>
+                <c:ptCount val="1"/>
+                <c:pt idx="0">
+                  <c:v>0.472</c:v>
+                </c:pt>
+              </c:numCache>
+            </c:numRef>
+          </c:val>
+        </c:ser>
+        <c:dLbls>
+          <c:showLegendKey val="0"/>
+          <c:showVal val="0"/>
+          <c:showCatName val="0"/>
+          <c:showSerName val="0"/>
+          <c:showPercent val="0"/>
+          <c:showBubbleSize val="0"/>
+        </c:dLbls>
+        <c:gapWidth val="219"/>
+        <c:overlap val="-27"/>
+        <c:axId val="2004820512"/>
+        <c:axId val="1903127680"/>
+      </c:barChart>
+      <c:catAx>
+        <c:axId val="2004820512"/>
+        <c:scaling>
+          <c:orientation val="minMax"/>
+        </c:scaling>
+        <c:delete val="1"/>
+        <c:axPos val="b"/>
+        <c:majorTickMark val="none"/>
+        <c:minorTickMark val="none"/>
+        <c:tickLblPos val="nextTo"/>
+        <c:crossAx val="1903127680"/>
+        <c:crosses val="autoZero"/>
+        <c:auto val="1"/>
+        <c:lblAlgn val="ctr"/>
+        <c:lblOffset val="100"/>
+        <c:noMultiLvlLbl val="0"/>
+      </c:catAx>
+      <c:valAx>
+        <c:axId val="1903127680"/>
+        <c:scaling>
+          <c:orientation val="minMax"/>
+          <c:max val="0.6"/>
+        </c:scaling>
+        <c:delete val="0"/>
+        <c:axPos val="l"/>
+        <c:majorGridlines>
+          <c:spPr>
+            <a:ln w="9525" cap="flat" cmpd="sng" algn="ctr">
+              <a:solidFill>
+                <a:schemeClr val="tx1">
+                  <a:lumMod val="15000"/>
+                  <a:lumOff val="85000"/>
+                </a:schemeClr>
+              </a:solidFill>
+              <a:round/>
+            </a:ln>
+            <a:effectLst/>
+          </c:spPr>
+        </c:majorGridlines>
+        <c:numFmt formatCode="General" sourceLinked="0"/>
+        <c:majorTickMark val="none"/>
+        <c:minorTickMark val="none"/>
+        <c:tickLblPos val="nextTo"/>
+        <c:spPr>
+          <a:noFill/>
+          <a:ln>
+            <a:noFill/>
+          </a:ln>
+          <a:effectLst/>
+        </c:spPr>
+        <c:txPr>
+          <a:bodyPr rot="-60000000" spcFirstLastPara="1" vertOverflow="ellipsis" vert="horz" wrap="square" anchor="ctr" anchorCtr="1"/>
+          <a:lstStyle/>
+          <a:p>
+            <a:pPr>
+              <a:defRPr sz="900" b="0" i="0" u="none" strike="noStrike" kern="1200" baseline="0">
+                <a:solidFill>
+                  <a:schemeClr val="tx1">
+                    <a:lumMod val="65000"/>
+                    <a:lumOff val="35000"/>
+                  </a:schemeClr>
+                </a:solidFill>
+                <a:latin typeface="+mn-lt"/>
+                <a:ea typeface="+mn-ea"/>
+                <a:cs typeface="+mn-cs"/>
+              </a:defRPr>
+            </a:pPr>
+            <a:endParaRPr lang="en-US"/>
+          </a:p>
+        </c:txPr>
+        <c:crossAx val="2004820512"/>
+        <c:crosses val="autoZero"/>
+        <c:crossBetween val="between"/>
+      </c:valAx>
+      <c:spPr>
+        <a:noFill/>
+        <a:ln>
+          <a:noFill/>
+        </a:ln>
+        <a:effectLst/>
+      </c:spPr>
+    </c:plotArea>
+    <c:legend>
+      <c:legendPos val="t"/>
+      <c:layout>
+        <c:manualLayout>
+          <c:xMode val="edge"/>
+          <c:yMode val="edge"/>
+          <c:x val="0.168764845605701"/>
+          <c:y val="0.0851529550185537"/>
+          <c:w val="0.738479809976247"/>
+          <c:h val="0.127595564395281"/>
+        </c:manualLayout>
+      </c:layout>
+      <c:overlay val="0"/>
+      <c:spPr>
+        <a:noFill/>
+        <a:ln>
+          <a:noFill/>
+        </a:ln>
+        <a:effectLst/>
+      </c:spPr>
+      <c:txPr>
+        <a:bodyPr rot="0" spcFirstLastPara="1" vertOverflow="ellipsis" vert="horz" wrap="square" anchor="ctr" anchorCtr="1"/>
+        <a:lstStyle/>
+        <a:p>
+          <a:pPr>
+            <a:defRPr sz="900" b="0" i="0" u="none" strike="noStrike" kern="1200" baseline="0">
+              <a:solidFill>
+                <a:schemeClr val="tx1">
+                  <a:lumMod val="65000"/>
+                  <a:lumOff val="35000"/>
+                </a:schemeClr>
+              </a:solidFill>
+              <a:latin typeface="+mn-lt"/>
+              <a:ea typeface="+mn-ea"/>
+              <a:cs typeface="+mn-cs"/>
+            </a:defRPr>
+          </a:pPr>
+          <a:endParaRPr lang="en-US"/>
+        </a:p>
+      </c:txPr>
+    </c:legend>
+    <c:plotVisOnly val="1"/>
+    <c:dispBlanksAs val="gap"/>
+    <c:showDLblsOverMax val="0"/>
+  </c:chart>
+  <c:spPr>
+    <a:noFill/>
+    <a:ln>
+      <a:noFill/>
+    </a:ln>
+    <a:effectLst/>
+  </c:spPr>
+  <c:txPr>
+    <a:bodyPr/>
+    <a:lstStyle/>
+    <a:p>
+      <a:pPr>
+        <a:defRPr/>
+      </a:pPr>
+      <a:endParaRPr lang="en-US"/>
+    </a:p>
+  </c:txPr>
+  <c:externalData r:id="rId3">
+    <c:autoUpdate val="0"/>
+  </c:externalData>
+</c:chartSpace>
+</file>
+
+<file path=ppt/charts/chart5.xml><?xml version="1.0" encoding="utf-8"?>
+<c:chartSpace xmlns:c="http://schemas.openxmlformats.org/drawingml/2006/chart" xmlns:a="http://schemas.openxmlformats.org/drawingml/2006/main" xmlns:r="http://schemas.openxmlformats.org/officeDocument/2006/relationships">
+  <c:date1904 val="0"/>
+  <c:lang val="en-US"/>
+  <c:roundedCorners val="0"/>
+  <mc:AlternateContent xmlns:mc="http://schemas.openxmlformats.org/markup-compatibility/2006">
+    <mc:Choice xmlns:c14="http://schemas.microsoft.com/office/drawing/2007/8/2/chart" Requires="c14">
+      <c14:style val="102"/>
+    </mc:Choice>
+    <mc:Fallback>
+      <c:style val="2"/>
+    </mc:Fallback>
+  </mc:AlternateContent>
+  <c:chart>
+    <c:title>
+      <c:tx>
+        <c:rich>
+          <a:bodyPr rot="0" spcFirstLastPara="1" vertOverflow="ellipsis" vert="horz" wrap="square" anchor="ctr" anchorCtr="1"/>
+          <a:lstStyle/>
+          <a:p>
+            <a:pPr>
+              <a:defRPr sz="1400" b="0" i="0" u="none" strike="noStrike" kern="1200" spc="0" baseline="0">
+                <a:solidFill>
+                  <a:schemeClr val="tx1">
+                    <a:lumMod val="65000"/>
+                    <a:lumOff val="35000"/>
+                  </a:schemeClr>
+                </a:solidFill>
+                <a:latin typeface="+mn-lt"/>
+                <a:ea typeface="+mn-ea"/>
+                <a:cs typeface="+mn-cs"/>
+              </a:defRPr>
+            </a:pPr>
+            <a:r>
+              <a:rPr lang="en-US" smtClean="0"/>
+              <a:t>Time comparison</a:t>
+            </a:r>
+            <a:endParaRPr lang="en-US" dirty="0"/>
+          </a:p>
+        </c:rich>
+      </c:tx>
+      <c:layout>
+        <c:manualLayout>
+          <c:xMode val="edge"/>
+          <c:yMode val="edge"/>
+          <c:x val="0.361812335958005"/>
+          <c:y val="0.0862284926285525"/>
+        </c:manualLayout>
+      </c:layout>
+      <c:overlay val="0"/>
+      <c:spPr>
+        <a:noFill/>
+        <a:ln>
+          <a:noFill/>
+        </a:ln>
+        <a:effectLst/>
+      </c:spPr>
+      <c:txPr>
+        <a:bodyPr rot="0" spcFirstLastPara="1" vertOverflow="ellipsis" vert="horz" wrap="square" anchor="ctr" anchorCtr="1"/>
+        <a:lstStyle/>
+        <a:p>
+          <a:pPr>
+            <a:defRPr sz="1400" b="0" i="0" u="none" strike="noStrike" kern="1200" spc="0" baseline="0">
+              <a:solidFill>
+                <a:schemeClr val="tx1">
+                  <a:lumMod val="65000"/>
+                  <a:lumOff val="35000"/>
+                </a:schemeClr>
+              </a:solidFill>
+              <a:latin typeface="+mn-lt"/>
+              <a:ea typeface="+mn-ea"/>
+              <a:cs typeface="+mn-cs"/>
+            </a:defRPr>
+          </a:pPr>
+          <a:endParaRPr lang="en-US"/>
+        </a:p>
+      </c:txPr>
+    </c:title>
+    <c:autoTitleDeleted val="0"/>
+    <c:plotArea>
+      <c:layout>
+        <c:manualLayout>
+          <c:layoutTarget val="inner"/>
+          <c:xMode val="edge"/>
+          <c:yMode val="edge"/>
+          <c:x val="0.0542384076990376"/>
+          <c:y val="0.235615668627859"/>
+          <c:w val="0.906872703412073"/>
+          <c:h val="0.652941204014787"/>
+        </c:manualLayout>
+      </c:layout>
+      <c:barChart>
+        <c:barDir val="col"/>
+        <c:grouping val="clustered"/>
+        <c:varyColors val="0"/>
+        <c:ser>
+          <c:idx val="0"/>
+          <c:order val="0"/>
+          <c:tx>
+            <c:strRef>
+              <c:f>BEST!$A$4:$C$4</c:f>
+              <c:strCache>
+                <c:ptCount val="3"/>
+                <c:pt idx="0">
+                  <c:v>1_3</c:v>
+                </c:pt>
+                <c:pt idx="1">
+                  <c:v>35</c:v>
+                </c:pt>
+                <c:pt idx="2">
+                  <c:v>Sklearn_SVM</c:v>
+                </c:pt>
+              </c:strCache>
+            </c:strRef>
+          </c:tx>
+          <c:spPr>
+            <a:solidFill>
+              <a:schemeClr val="accent1"/>
+            </a:solidFill>
+            <a:ln>
+              <a:noFill/>
+            </a:ln>
+            <a:effectLst/>
+          </c:spPr>
+          <c:invertIfNegative val="0"/>
+          <c:val>
+            <c:numRef>
+              <c:f>BEST!$H$4</c:f>
+              <c:numCache>
+                <c:formatCode>General</c:formatCode>
+                <c:ptCount val="1"/>
+                <c:pt idx="0">
+                  <c:v>0.993</c:v>
+                </c:pt>
+              </c:numCache>
+            </c:numRef>
+          </c:val>
+        </c:ser>
+        <c:ser>
+          <c:idx val="1"/>
+          <c:order val="1"/>
+          <c:tx>
+            <c:strRef>
+              <c:f>BEST!$A$8:$C$8</c:f>
+              <c:strCache>
+                <c:ptCount val="3"/>
+                <c:pt idx="0">
+                  <c:v>2_3</c:v>
+                </c:pt>
+                <c:pt idx="1">
+                  <c:v>19</c:v>
+                </c:pt>
+                <c:pt idx="2">
+                  <c:v>Sklearn_SVM</c:v>
+                </c:pt>
+              </c:strCache>
+            </c:strRef>
+          </c:tx>
+          <c:spPr>
+            <a:solidFill>
+              <a:schemeClr val="accent2"/>
+            </a:solidFill>
+            <a:ln>
+              <a:noFill/>
+            </a:ln>
+            <a:effectLst/>
+          </c:spPr>
+          <c:invertIfNegative val="0"/>
+          <c:val>
+            <c:numRef>
+              <c:f>BEST!$H$8</c:f>
+              <c:numCache>
+                <c:formatCode>General</c:formatCode>
+                <c:ptCount val="1"/>
+                <c:pt idx="0">
+                  <c:v>0.841</c:v>
+                </c:pt>
+              </c:numCache>
+            </c:numRef>
+          </c:val>
+        </c:ser>
+        <c:ser>
+          <c:idx val="2"/>
+          <c:order val="2"/>
+          <c:tx>
+            <c:strRef>
+              <c:f>BEST!$A$10:$C$10</c:f>
+              <c:strCache>
+                <c:ptCount val="3"/>
+                <c:pt idx="0">
+                  <c:v>3</c:v>
+                </c:pt>
+                <c:pt idx="1">
+                  <c:v>71</c:v>
+                </c:pt>
+                <c:pt idx="2">
+                  <c:v>Sklearn_SVM</c:v>
+                </c:pt>
+              </c:strCache>
+            </c:strRef>
+          </c:tx>
+          <c:spPr>
+            <a:solidFill>
+              <a:schemeClr val="accent3"/>
+            </a:solidFill>
+            <a:ln>
+              <a:noFill/>
+            </a:ln>
+            <a:effectLst/>
+          </c:spPr>
+          <c:invertIfNegative val="0"/>
+          <c:val>
+            <c:numRef>
+              <c:f>BEST!$H$10</c:f>
+              <c:numCache>
+                <c:formatCode>General</c:formatCode>
+                <c:ptCount val="1"/>
+                <c:pt idx="0">
+                  <c:v>7.436</c:v>
+                </c:pt>
+              </c:numCache>
+            </c:numRef>
+          </c:val>
+        </c:ser>
+        <c:ser>
+          <c:idx val="3"/>
+          <c:order val="3"/>
+          <c:tx>
+            <c:strRef>
+              <c:f>BEST!$A$12:$C$12</c:f>
+              <c:strCache>
+                <c:ptCount val="3"/>
+                <c:pt idx="0">
+                  <c:v>5</c:v>
+                </c:pt>
+                <c:pt idx="1">
+                  <c:v>19</c:v>
+                </c:pt>
+                <c:pt idx="2">
+                  <c:v>my_poisson</c:v>
+                </c:pt>
+              </c:strCache>
+            </c:strRef>
+          </c:tx>
+          <c:spPr>
+            <a:solidFill>
+              <a:schemeClr val="accent4"/>
+            </a:solidFill>
+            <a:ln>
+              <a:noFill/>
+            </a:ln>
+            <a:effectLst/>
+          </c:spPr>
+          <c:invertIfNegative val="0"/>
+          <c:val>
+            <c:numRef>
+              <c:f>BEST!$H$12</c:f>
+              <c:numCache>
+                <c:formatCode>General</c:formatCode>
+                <c:ptCount val="1"/>
+                <c:pt idx="0">
+                  <c:v>0.077</c:v>
+                </c:pt>
+              </c:numCache>
+            </c:numRef>
+          </c:val>
+        </c:ser>
+        <c:dLbls>
+          <c:showLegendKey val="0"/>
+          <c:showVal val="0"/>
+          <c:showCatName val="0"/>
+          <c:showSerName val="0"/>
+          <c:showPercent val="0"/>
+          <c:showBubbleSize val="0"/>
+        </c:dLbls>
+        <c:gapWidth val="219"/>
+        <c:overlap val="-27"/>
+        <c:axId val="2076415488"/>
+        <c:axId val="1948264496"/>
+      </c:barChart>
+      <c:catAx>
+        <c:axId val="2076415488"/>
+        <c:scaling>
+          <c:orientation val="minMax"/>
+        </c:scaling>
+        <c:delete val="0"/>
+        <c:axPos val="b"/>
+        <c:majorTickMark val="none"/>
+        <c:minorTickMark val="none"/>
+        <c:tickLblPos val="nextTo"/>
+        <c:spPr>
+          <a:noFill/>
+          <a:ln w="9525" cap="flat" cmpd="sng" algn="ctr">
+            <a:solidFill>
+              <a:schemeClr val="tx1">
+                <a:lumMod val="15000"/>
+                <a:lumOff val="85000"/>
+              </a:schemeClr>
+            </a:solidFill>
+            <a:round/>
+          </a:ln>
+          <a:effectLst/>
+        </c:spPr>
+        <c:txPr>
+          <a:bodyPr rot="-60000000" spcFirstLastPara="1" vertOverflow="ellipsis" vert="horz" wrap="square" anchor="ctr" anchorCtr="1"/>
+          <a:lstStyle/>
+          <a:p>
+            <a:pPr>
+              <a:defRPr sz="900" b="0" i="0" u="none" strike="noStrike" kern="1200" baseline="0">
+                <a:solidFill>
+                  <a:schemeClr val="tx1">
+                    <a:lumMod val="65000"/>
+                    <a:lumOff val="35000"/>
+                  </a:schemeClr>
+                </a:solidFill>
+                <a:latin typeface="+mn-lt"/>
+                <a:ea typeface="+mn-ea"/>
+                <a:cs typeface="+mn-cs"/>
+              </a:defRPr>
+            </a:pPr>
+            <a:endParaRPr lang="en-US"/>
+          </a:p>
+        </c:txPr>
+        <c:crossAx val="1948264496"/>
+        <c:crosses val="autoZero"/>
+        <c:auto val="1"/>
+        <c:lblAlgn val="ctr"/>
+        <c:lblOffset val="100"/>
+        <c:noMultiLvlLbl val="0"/>
+      </c:catAx>
+      <c:valAx>
+        <c:axId val="1948264496"/>
+        <c:scaling>
+          <c:orientation val="minMax"/>
+        </c:scaling>
+        <c:delete val="0"/>
+        <c:axPos val="l"/>
+        <c:majorGridlines>
+          <c:spPr>
+            <a:ln w="9525" cap="flat" cmpd="sng" algn="ctr">
+              <a:solidFill>
+                <a:schemeClr val="tx1">
+                  <a:lumMod val="15000"/>
+                  <a:lumOff val="85000"/>
+                </a:schemeClr>
+              </a:solidFill>
+              <a:round/>
+            </a:ln>
+            <a:effectLst/>
+          </c:spPr>
+        </c:majorGridlines>
+        <c:numFmt formatCode="General" sourceLinked="0"/>
+        <c:majorTickMark val="none"/>
+        <c:minorTickMark val="none"/>
+        <c:tickLblPos val="nextTo"/>
+        <c:spPr>
+          <a:noFill/>
+          <a:ln>
+            <a:noFill/>
+          </a:ln>
+          <a:effectLst/>
+        </c:spPr>
+        <c:txPr>
+          <a:bodyPr rot="-60000000" spcFirstLastPara="1" vertOverflow="ellipsis" vert="horz" wrap="square" anchor="ctr" anchorCtr="1"/>
+          <a:lstStyle/>
+          <a:p>
+            <a:pPr>
+              <a:defRPr sz="900" b="0" i="0" u="none" strike="noStrike" kern="1200" baseline="0">
+                <a:solidFill>
+                  <a:schemeClr val="tx1">
+                    <a:lumMod val="65000"/>
+                    <a:lumOff val="35000"/>
+                  </a:schemeClr>
+                </a:solidFill>
+                <a:latin typeface="+mn-lt"/>
+                <a:ea typeface="+mn-ea"/>
+                <a:cs typeface="+mn-cs"/>
+              </a:defRPr>
+            </a:pPr>
+            <a:endParaRPr lang="en-US"/>
+          </a:p>
+        </c:txPr>
+        <c:crossAx val="2076415488"/>
+        <c:crosses val="autoZero"/>
+        <c:crossBetween val="between"/>
+      </c:valAx>
+      <c:spPr>
+        <a:noFill/>
+        <a:ln>
+          <a:noFill/>
+        </a:ln>
+        <a:effectLst/>
+      </c:spPr>
+    </c:plotArea>
     <c:plotVisOnly val="1"/>
     <c:dispBlanksAs val="gap"/>
     <c:showDLblsOverMax val="0"/>
@@ -1912,6 +2761,86 @@
 <cs:colorStyle xmlns:cs="http://schemas.microsoft.com/office/drawing/2012/chartStyle" xmlns:a="http://schemas.openxmlformats.org/drawingml/2006/main" meth="cycle" id="12">
   <a:schemeClr val="accent2"/>
   <a:schemeClr val="accent4"/>
+  <a:schemeClr val="accent6"/>
+  <cs:variation/>
+  <cs:variation>
+    <a:lumMod val="60000"/>
+  </cs:variation>
+  <cs:variation>
+    <a:lumMod val="80000"/>
+    <a:lumOff val="20000"/>
+  </cs:variation>
+  <cs:variation>
+    <a:lumMod val="80000"/>
+  </cs:variation>
+  <cs:variation>
+    <a:lumMod val="60000"/>
+    <a:lumOff val="40000"/>
+  </cs:variation>
+  <cs:variation>
+    <a:lumMod val="50000"/>
+  </cs:variation>
+  <cs:variation>
+    <a:lumMod val="70000"/>
+    <a:lumOff val="30000"/>
+  </cs:variation>
+  <cs:variation>
+    <a:lumMod val="70000"/>
+  </cs:variation>
+  <cs:variation>
+    <a:lumMod val="50000"/>
+    <a:lumOff val="50000"/>
+  </cs:variation>
+</cs:colorStyle>
+</file>
+
+<file path=ppt/charts/colors4.xml><?xml version="1.0" encoding="utf-8"?>
+<cs:colorStyle xmlns:cs="http://schemas.microsoft.com/office/drawing/2012/chartStyle" xmlns:a="http://schemas.openxmlformats.org/drawingml/2006/main" meth="cycle" id="10">
+  <a:schemeClr val="accent1"/>
+  <a:schemeClr val="accent2"/>
+  <a:schemeClr val="accent3"/>
+  <a:schemeClr val="accent4"/>
+  <a:schemeClr val="accent5"/>
+  <a:schemeClr val="accent6"/>
+  <cs:variation/>
+  <cs:variation>
+    <a:lumMod val="60000"/>
+  </cs:variation>
+  <cs:variation>
+    <a:lumMod val="80000"/>
+    <a:lumOff val="20000"/>
+  </cs:variation>
+  <cs:variation>
+    <a:lumMod val="80000"/>
+  </cs:variation>
+  <cs:variation>
+    <a:lumMod val="60000"/>
+    <a:lumOff val="40000"/>
+  </cs:variation>
+  <cs:variation>
+    <a:lumMod val="50000"/>
+  </cs:variation>
+  <cs:variation>
+    <a:lumMod val="70000"/>
+    <a:lumOff val="30000"/>
+  </cs:variation>
+  <cs:variation>
+    <a:lumMod val="70000"/>
+  </cs:variation>
+  <cs:variation>
+    <a:lumMod val="50000"/>
+    <a:lumOff val="50000"/>
+  </cs:variation>
+</cs:colorStyle>
+</file>
+
+<file path=ppt/charts/colors5.xml><?xml version="1.0" encoding="utf-8"?>
+<cs:colorStyle xmlns:cs="http://schemas.microsoft.com/office/drawing/2012/chartStyle" xmlns:a="http://schemas.openxmlformats.org/drawingml/2006/main" meth="cycle" id="10">
+  <a:schemeClr val="accent1"/>
+  <a:schemeClr val="accent2"/>
+  <a:schemeClr val="accent3"/>
+  <a:schemeClr val="accent4"/>
+  <a:schemeClr val="accent5"/>
   <a:schemeClr val="accent6"/>
   <cs:variation/>
   <cs:variation>
@@ -2952,6 +3881,1012 @@
 </file>
 
 <file path=ppt/charts/style3.xml><?xml version="1.0" encoding="utf-8"?>
+<cs:chartStyle xmlns:cs="http://schemas.microsoft.com/office/drawing/2012/chartStyle" xmlns:a="http://schemas.openxmlformats.org/drawingml/2006/main" id="201">
+  <cs:axisTitle>
+    <cs:lnRef idx="0"/>
+    <cs:fillRef idx="0"/>
+    <cs:effectRef idx="0"/>
+    <cs:fontRef idx="minor">
+      <a:schemeClr val="tx1">
+        <a:lumMod val="65000"/>
+        <a:lumOff val="35000"/>
+      </a:schemeClr>
+    </cs:fontRef>
+    <cs:defRPr sz="1000" kern="1200"/>
+  </cs:axisTitle>
+  <cs:categoryAxis>
+    <cs:lnRef idx="0"/>
+    <cs:fillRef idx="0"/>
+    <cs:effectRef idx="0"/>
+    <cs:fontRef idx="minor">
+      <a:schemeClr val="tx1">
+        <a:lumMod val="65000"/>
+        <a:lumOff val="35000"/>
+      </a:schemeClr>
+    </cs:fontRef>
+    <cs:spPr>
+      <a:ln w="9525" cap="flat" cmpd="sng" algn="ctr">
+        <a:solidFill>
+          <a:schemeClr val="tx1">
+            <a:lumMod val="15000"/>
+            <a:lumOff val="85000"/>
+          </a:schemeClr>
+        </a:solidFill>
+        <a:round/>
+      </a:ln>
+    </cs:spPr>
+    <cs:defRPr sz="900" kern="1200"/>
+  </cs:categoryAxis>
+  <cs:chartArea mods="allowNoFillOverride allowNoLineOverride">
+    <cs:lnRef idx="0"/>
+    <cs:fillRef idx="0"/>
+    <cs:effectRef idx="0"/>
+    <cs:fontRef idx="minor">
+      <a:schemeClr val="tx1"/>
+    </cs:fontRef>
+    <cs:spPr>
+      <a:solidFill>
+        <a:schemeClr val="bg1"/>
+      </a:solidFill>
+      <a:ln w="9525" cap="flat" cmpd="sng" algn="ctr">
+        <a:solidFill>
+          <a:schemeClr val="tx1">
+            <a:lumMod val="15000"/>
+            <a:lumOff val="85000"/>
+          </a:schemeClr>
+        </a:solidFill>
+        <a:round/>
+      </a:ln>
+    </cs:spPr>
+    <cs:defRPr sz="1000" kern="1200"/>
+  </cs:chartArea>
+  <cs:dataLabel>
+    <cs:lnRef idx="0"/>
+    <cs:fillRef idx="0"/>
+    <cs:effectRef idx="0"/>
+    <cs:fontRef idx="minor">
+      <a:schemeClr val="tx1">
+        <a:lumMod val="75000"/>
+        <a:lumOff val="25000"/>
+      </a:schemeClr>
+    </cs:fontRef>
+    <cs:defRPr sz="900" kern="1200"/>
+  </cs:dataLabel>
+  <cs:dataLabelCallout>
+    <cs:lnRef idx="0"/>
+    <cs:fillRef idx="0"/>
+    <cs:effectRef idx="0"/>
+    <cs:fontRef idx="minor">
+      <a:schemeClr val="dk1">
+        <a:lumMod val="65000"/>
+        <a:lumOff val="35000"/>
+      </a:schemeClr>
+    </cs:fontRef>
+    <cs:spPr>
+      <a:solidFill>
+        <a:schemeClr val="lt1"/>
+      </a:solidFill>
+      <a:ln>
+        <a:solidFill>
+          <a:schemeClr val="dk1">
+            <a:lumMod val="25000"/>
+            <a:lumOff val="75000"/>
+          </a:schemeClr>
+        </a:solidFill>
+      </a:ln>
+    </cs:spPr>
+    <cs:defRPr sz="900" kern="1200"/>
+    <cs:bodyPr rot="0" spcFirstLastPara="1" vertOverflow="clip" horzOverflow="clip" vert="horz" wrap="square" lIns="36576" tIns="18288" rIns="36576" bIns="18288" anchor="ctr" anchorCtr="1">
+      <a:spAutoFit/>
+    </cs:bodyPr>
+  </cs:dataLabelCallout>
+  <cs:dataPoint>
+    <cs:lnRef idx="0"/>
+    <cs:fillRef idx="1">
+      <cs:styleClr val="auto"/>
+    </cs:fillRef>
+    <cs:effectRef idx="0"/>
+    <cs:fontRef idx="minor">
+      <a:schemeClr val="tx1"/>
+    </cs:fontRef>
+  </cs:dataPoint>
+  <cs:dataPoint3D>
+    <cs:lnRef idx="0"/>
+    <cs:fillRef idx="1">
+      <cs:styleClr val="auto"/>
+    </cs:fillRef>
+    <cs:effectRef idx="0"/>
+    <cs:fontRef idx="minor">
+      <a:schemeClr val="tx1"/>
+    </cs:fontRef>
+  </cs:dataPoint3D>
+  <cs:dataPointLine>
+    <cs:lnRef idx="0">
+      <cs:styleClr val="auto"/>
+    </cs:lnRef>
+    <cs:fillRef idx="1"/>
+    <cs:effectRef idx="0"/>
+    <cs:fontRef idx="minor">
+      <a:schemeClr val="tx1"/>
+    </cs:fontRef>
+    <cs:spPr>
+      <a:ln w="28575" cap="rnd">
+        <a:solidFill>
+          <a:schemeClr val="phClr"/>
+        </a:solidFill>
+        <a:round/>
+      </a:ln>
+    </cs:spPr>
+  </cs:dataPointLine>
+  <cs:dataPointMarker>
+    <cs:lnRef idx="0">
+      <cs:styleClr val="auto"/>
+    </cs:lnRef>
+    <cs:fillRef idx="1">
+      <cs:styleClr val="auto"/>
+    </cs:fillRef>
+    <cs:effectRef idx="0"/>
+    <cs:fontRef idx="minor">
+      <a:schemeClr val="tx1"/>
+    </cs:fontRef>
+    <cs:spPr>
+      <a:ln w="9525">
+        <a:solidFill>
+          <a:schemeClr val="phClr"/>
+        </a:solidFill>
+      </a:ln>
+    </cs:spPr>
+  </cs:dataPointMarker>
+  <cs:dataPointMarkerLayout symbol="circle" size="5"/>
+  <cs:dataPointWireframe>
+    <cs:lnRef idx="0">
+      <cs:styleClr val="auto"/>
+    </cs:lnRef>
+    <cs:fillRef idx="1"/>
+    <cs:effectRef idx="0"/>
+    <cs:fontRef idx="minor">
+      <a:schemeClr val="tx1"/>
+    </cs:fontRef>
+    <cs:spPr>
+      <a:ln w="9525" cap="rnd">
+        <a:solidFill>
+          <a:schemeClr val="phClr"/>
+        </a:solidFill>
+        <a:round/>
+      </a:ln>
+    </cs:spPr>
+  </cs:dataPointWireframe>
+  <cs:dataTable>
+    <cs:lnRef idx="0"/>
+    <cs:fillRef idx="0"/>
+    <cs:effectRef idx="0"/>
+    <cs:fontRef idx="minor">
+      <a:schemeClr val="tx1">
+        <a:lumMod val="65000"/>
+        <a:lumOff val="35000"/>
+      </a:schemeClr>
+    </cs:fontRef>
+    <cs:spPr>
+      <a:noFill/>
+      <a:ln w="9525" cap="flat" cmpd="sng" algn="ctr">
+        <a:solidFill>
+          <a:schemeClr val="tx1">
+            <a:lumMod val="15000"/>
+            <a:lumOff val="85000"/>
+          </a:schemeClr>
+        </a:solidFill>
+        <a:round/>
+      </a:ln>
+    </cs:spPr>
+    <cs:defRPr sz="900" kern="1200"/>
+  </cs:dataTable>
+  <cs:downBar>
+    <cs:lnRef idx="0"/>
+    <cs:fillRef idx="0"/>
+    <cs:effectRef idx="0"/>
+    <cs:fontRef idx="minor">
+      <a:schemeClr val="dk1"/>
+    </cs:fontRef>
+    <cs:spPr>
+      <a:solidFill>
+        <a:schemeClr val="dk1">
+          <a:lumMod val="65000"/>
+          <a:lumOff val="35000"/>
+        </a:schemeClr>
+      </a:solidFill>
+      <a:ln w="9525">
+        <a:solidFill>
+          <a:schemeClr val="tx1">
+            <a:lumMod val="65000"/>
+            <a:lumOff val="35000"/>
+          </a:schemeClr>
+        </a:solidFill>
+      </a:ln>
+    </cs:spPr>
+  </cs:downBar>
+  <cs:dropLine>
+    <cs:lnRef idx="0"/>
+    <cs:fillRef idx="0"/>
+    <cs:effectRef idx="0"/>
+    <cs:fontRef idx="minor">
+      <a:schemeClr val="tx1"/>
+    </cs:fontRef>
+    <cs:spPr>
+      <a:ln w="9525" cap="flat" cmpd="sng" algn="ctr">
+        <a:solidFill>
+          <a:schemeClr val="tx1">
+            <a:lumMod val="35000"/>
+            <a:lumOff val="65000"/>
+          </a:schemeClr>
+        </a:solidFill>
+        <a:round/>
+      </a:ln>
+    </cs:spPr>
+  </cs:dropLine>
+  <cs:errorBar>
+    <cs:lnRef idx="0"/>
+    <cs:fillRef idx="0"/>
+    <cs:effectRef idx="0"/>
+    <cs:fontRef idx="minor">
+      <a:schemeClr val="tx1"/>
+    </cs:fontRef>
+    <cs:spPr>
+      <a:ln w="9525" cap="flat" cmpd="sng" algn="ctr">
+        <a:solidFill>
+          <a:schemeClr val="tx1">
+            <a:lumMod val="65000"/>
+            <a:lumOff val="35000"/>
+          </a:schemeClr>
+        </a:solidFill>
+        <a:round/>
+      </a:ln>
+    </cs:spPr>
+  </cs:errorBar>
+  <cs:floor>
+    <cs:lnRef idx="0"/>
+    <cs:fillRef idx="0"/>
+    <cs:effectRef idx="0"/>
+    <cs:fontRef idx="minor">
+      <a:schemeClr val="tx1"/>
+    </cs:fontRef>
+    <cs:spPr>
+      <a:noFill/>
+      <a:ln>
+        <a:noFill/>
+      </a:ln>
+    </cs:spPr>
+  </cs:floor>
+  <cs:gridlineMajor>
+    <cs:lnRef idx="0"/>
+    <cs:fillRef idx="0"/>
+    <cs:effectRef idx="0"/>
+    <cs:fontRef idx="minor">
+      <a:schemeClr val="tx1"/>
+    </cs:fontRef>
+    <cs:spPr>
+      <a:ln w="9525" cap="flat" cmpd="sng" algn="ctr">
+        <a:solidFill>
+          <a:schemeClr val="tx1">
+            <a:lumMod val="15000"/>
+            <a:lumOff val="85000"/>
+          </a:schemeClr>
+        </a:solidFill>
+        <a:round/>
+      </a:ln>
+    </cs:spPr>
+  </cs:gridlineMajor>
+  <cs:gridlineMinor>
+    <cs:lnRef idx="0"/>
+    <cs:fillRef idx="0"/>
+    <cs:effectRef idx="0"/>
+    <cs:fontRef idx="minor">
+      <a:schemeClr val="tx1"/>
+    </cs:fontRef>
+    <cs:spPr>
+      <a:ln w="9525" cap="flat" cmpd="sng" algn="ctr">
+        <a:solidFill>
+          <a:schemeClr val="tx1">
+            <a:lumMod val="5000"/>
+            <a:lumOff val="95000"/>
+          </a:schemeClr>
+        </a:solidFill>
+        <a:round/>
+      </a:ln>
+    </cs:spPr>
+  </cs:gridlineMinor>
+  <cs:hiLoLine>
+    <cs:lnRef idx="0"/>
+    <cs:fillRef idx="0"/>
+    <cs:effectRef idx="0"/>
+    <cs:fontRef idx="minor">
+      <a:schemeClr val="tx1"/>
+    </cs:fontRef>
+    <cs:spPr>
+      <a:ln w="9525" cap="flat" cmpd="sng" algn="ctr">
+        <a:solidFill>
+          <a:schemeClr val="tx1">
+            <a:lumMod val="75000"/>
+            <a:lumOff val="25000"/>
+          </a:schemeClr>
+        </a:solidFill>
+        <a:round/>
+      </a:ln>
+    </cs:spPr>
+  </cs:hiLoLine>
+  <cs:leaderLine>
+    <cs:lnRef idx="0"/>
+    <cs:fillRef idx="0"/>
+    <cs:effectRef idx="0"/>
+    <cs:fontRef idx="minor">
+      <a:schemeClr val="tx1"/>
+    </cs:fontRef>
+    <cs:spPr>
+      <a:ln w="9525" cap="flat" cmpd="sng" algn="ctr">
+        <a:solidFill>
+          <a:schemeClr val="tx1">
+            <a:lumMod val="35000"/>
+            <a:lumOff val="65000"/>
+          </a:schemeClr>
+        </a:solidFill>
+        <a:round/>
+      </a:ln>
+    </cs:spPr>
+  </cs:leaderLine>
+  <cs:legend>
+    <cs:lnRef idx="0"/>
+    <cs:fillRef idx="0"/>
+    <cs:effectRef idx="0"/>
+    <cs:fontRef idx="minor">
+      <a:schemeClr val="tx1">
+        <a:lumMod val="65000"/>
+        <a:lumOff val="35000"/>
+      </a:schemeClr>
+    </cs:fontRef>
+    <cs:defRPr sz="900" kern="1200"/>
+  </cs:legend>
+  <cs:plotArea mods="allowNoFillOverride allowNoLineOverride">
+    <cs:lnRef idx="0"/>
+    <cs:fillRef idx="0"/>
+    <cs:effectRef idx="0"/>
+    <cs:fontRef idx="minor">
+      <a:schemeClr val="tx1"/>
+    </cs:fontRef>
+  </cs:plotArea>
+  <cs:plotArea3D mods="allowNoFillOverride allowNoLineOverride">
+    <cs:lnRef idx="0"/>
+    <cs:fillRef idx="0"/>
+    <cs:effectRef idx="0"/>
+    <cs:fontRef idx="minor">
+      <a:schemeClr val="tx1"/>
+    </cs:fontRef>
+  </cs:plotArea3D>
+  <cs:seriesAxis>
+    <cs:lnRef idx="0"/>
+    <cs:fillRef idx="0"/>
+    <cs:effectRef idx="0"/>
+    <cs:fontRef idx="minor">
+      <a:schemeClr val="tx1">
+        <a:lumMod val="65000"/>
+        <a:lumOff val="35000"/>
+      </a:schemeClr>
+    </cs:fontRef>
+    <cs:defRPr sz="900" kern="1200"/>
+  </cs:seriesAxis>
+  <cs:seriesLine>
+    <cs:lnRef idx="0"/>
+    <cs:fillRef idx="0"/>
+    <cs:effectRef idx="0"/>
+    <cs:fontRef idx="minor">
+      <a:schemeClr val="tx1"/>
+    </cs:fontRef>
+    <cs:spPr>
+      <a:ln w="9525" cap="flat" cmpd="sng" algn="ctr">
+        <a:solidFill>
+          <a:schemeClr val="tx1">
+            <a:lumMod val="35000"/>
+            <a:lumOff val="65000"/>
+          </a:schemeClr>
+        </a:solidFill>
+        <a:round/>
+      </a:ln>
+    </cs:spPr>
+  </cs:seriesLine>
+  <cs:title>
+    <cs:lnRef idx="0"/>
+    <cs:fillRef idx="0"/>
+    <cs:effectRef idx="0"/>
+    <cs:fontRef idx="minor">
+      <a:schemeClr val="tx1">
+        <a:lumMod val="65000"/>
+        <a:lumOff val="35000"/>
+      </a:schemeClr>
+    </cs:fontRef>
+    <cs:defRPr sz="1400" b="0" kern="1200" spc="0" baseline="0"/>
+  </cs:title>
+  <cs:trendline>
+    <cs:lnRef idx="0">
+      <cs:styleClr val="auto"/>
+    </cs:lnRef>
+    <cs:fillRef idx="0"/>
+    <cs:effectRef idx="0"/>
+    <cs:fontRef idx="minor">
+      <a:schemeClr val="tx1"/>
+    </cs:fontRef>
+    <cs:spPr>
+      <a:ln w="19050" cap="rnd">
+        <a:solidFill>
+          <a:schemeClr val="phClr"/>
+        </a:solidFill>
+        <a:prstDash val="sysDot"/>
+      </a:ln>
+    </cs:spPr>
+  </cs:trendline>
+  <cs:trendlineLabel>
+    <cs:lnRef idx="0"/>
+    <cs:fillRef idx="0"/>
+    <cs:effectRef idx="0"/>
+    <cs:fontRef idx="minor">
+      <a:schemeClr val="tx1">
+        <a:lumMod val="65000"/>
+        <a:lumOff val="35000"/>
+      </a:schemeClr>
+    </cs:fontRef>
+    <cs:defRPr sz="900" kern="1200"/>
+  </cs:trendlineLabel>
+  <cs:upBar>
+    <cs:lnRef idx="0"/>
+    <cs:fillRef idx="0"/>
+    <cs:effectRef idx="0"/>
+    <cs:fontRef idx="minor">
+      <a:schemeClr val="dk1"/>
+    </cs:fontRef>
+    <cs:spPr>
+      <a:solidFill>
+        <a:schemeClr val="lt1"/>
+      </a:solidFill>
+      <a:ln w="9525">
+        <a:solidFill>
+          <a:schemeClr val="tx1">
+            <a:lumMod val="15000"/>
+            <a:lumOff val="85000"/>
+          </a:schemeClr>
+        </a:solidFill>
+      </a:ln>
+    </cs:spPr>
+  </cs:upBar>
+  <cs:valueAxis>
+    <cs:lnRef idx="0"/>
+    <cs:fillRef idx="0"/>
+    <cs:effectRef idx="0"/>
+    <cs:fontRef idx="minor">
+      <a:schemeClr val="tx1">
+        <a:lumMod val="65000"/>
+        <a:lumOff val="35000"/>
+      </a:schemeClr>
+    </cs:fontRef>
+    <cs:defRPr sz="900" kern="1200"/>
+  </cs:valueAxis>
+  <cs:wall>
+    <cs:lnRef idx="0"/>
+    <cs:fillRef idx="0"/>
+    <cs:effectRef idx="0"/>
+    <cs:fontRef idx="minor">
+      <a:schemeClr val="tx1"/>
+    </cs:fontRef>
+    <cs:spPr>
+      <a:noFill/>
+      <a:ln>
+        <a:noFill/>
+      </a:ln>
+    </cs:spPr>
+  </cs:wall>
+</cs:chartStyle>
+</file>
+
+<file path=ppt/charts/style4.xml><?xml version="1.0" encoding="utf-8"?>
+<cs:chartStyle xmlns:cs="http://schemas.microsoft.com/office/drawing/2012/chartStyle" xmlns:a="http://schemas.openxmlformats.org/drawingml/2006/main" id="201">
+  <cs:axisTitle>
+    <cs:lnRef idx="0"/>
+    <cs:fillRef idx="0"/>
+    <cs:effectRef idx="0"/>
+    <cs:fontRef idx="minor">
+      <a:schemeClr val="tx1">
+        <a:lumMod val="65000"/>
+        <a:lumOff val="35000"/>
+      </a:schemeClr>
+    </cs:fontRef>
+    <cs:defRPr sz="1000" kern="1200"/>
+  </cs:axisTitle>
+  <cs:categoryAxis>
+    <cs:lnRef idx="0"/>
+    <cs:fillRef idx="0"/>
+    <cs:effectRef idx="0"/>
+    <cs:fontRef idx="minor">
+      <a:schemeClr val="tx1">
+        <a:lumMod val="65000"/>
+        <a:lumOff val="35000"/>
+      </a:schemeClr>
+    </cs:fontRef>
+    <cs:spPr>
+      <a:ln w="9525" cap="flat" cmpd="sng" algn="ctr">
+        <a:solidFill>
+          <a:schemeClr val="tx1">
+            <a:lumMod val="15000"/>
+            <a:lumOff val="85000"/>
+          </a:schemeClr>
+        </a:solidFill>
+        <a:round/>
+      </a:ln>
+    </cs:spPr>
+    <cs:defRPr sz="900" kern="1200"/>
+  </cs:categoryAxis>
+  <cs:chartArea mods="allowNoFillOverride allowNoLineOverride">
+    <cs:lnRef idx="0"/>
+    <cs:fillRef idx="0"/>
+    <cs:effectRef idx="0"/>
+    <cs:fontRef idx="minor">
+      <a:schemeClr val="tx1"/>
+    </cs:fontRef>
+    <cs:spPr>
+      <a:solidFill>
+        <a:schemeClr val="bg1"/>
+      </a:solidFill>
+      <a:ln w="9525" cap="flat" cmpd="sng" algn="ctr">
+        <a:solidFill>
+          <a:schemeClr val="tx1">
+            <a:lumMod val="15000"/>
+            <a:lumOff val="85000"/>
+          </a:schemeClr>
+        </a:solidFill>
+        <a:round/>
+      </a:ln>
+    </cs:spPr>
+    <cs:defRPr sz="1000" kern="1200"/>
+  </cs:chartArea>
+  <cs:dataLabel>
+    <cs:lnRef idx="0"/>
+    <cs:fillRef idx="0"/>
+    <cs:effectRef idx="0"/>
+    <cs:fontRef idx="minor">
+      <a:schemeClr val="tx1">
+        <a:lumMod val="75000"/>
+        <a:lumOff val="25000"/>
+      </a:schemeClr>
+    </cs:fontRef>
+    <cs:defRPr sz="900" kern="1200"/>
+  </cs:dataLabel>
+  <cs:dataLabelCallout>
+    <cs:lnRef idx="0"/>
+    <cs:fillRef idx="0"/>
+    <cs:effectRef idx="0"/>
+    <cs:fontRef idx="minor">
+      <a:schemeClr val="dk1">
+        <a:lumMod val="65000"/>
+        <a:lumOff val="35000"/>
+      </a:schemeClr>
+    </cs:fontRef>
+    <cs:spPr>
+      <a:solidFill>
+        <a:schemeClr val="lt1"/>
+      </a:solidFill>
+      <a:ln>
+        <a:solidFill>
+          <a:schemeClr val="dk1">
+            <a:lumMod val="25000"/>
+            <a:lumOff val="75000"/>
+          </a:schemeClr>
+        </a:solidFill>
+      </a:ln>
+    </cs:spPr>
+    <cs:defRPr sz="900" kern="1200"/>
+    <cs:bodyPr rot="0" spcFirstLastPara="1" vertOverflow="clip" horzOverflow="clip" vert="horz" wrap="square" lIns="36576" tIns="18288" rIns="36576" bIns="18288" anchor="ctr" anchorCtr="1">
+      <a:spAutoFit/>
+    </cs:bodyPr>
+  </cs:dataLabelCallout>
+  <cs:dataPoint>
+    <cs:lnRef idx="0"/>
+    <cs:fillRef idx="1">
+      <cs:styleClr val="auto"/>
+    </cs:fillRef>
+    <cs:effectRef idx="0"/>
+    <cs:fontRef idx="minor">
+      <a:schemeClr val="tx1"/>
+    </cs:fontRef>
+  </cs:dataPoint>
+  <cs:dataPoint3D>
+    <cs:lnRef idx="0"/>
+    <cs:fillRef idx="1">
+      <cs:styleClr val="auto"/>
+    </cs:fillRef>
+    <cs:effectRef idx="0"/>
+    <cs:fontRef idx="minor">
+      <a:schemeClr val="tx1"/>
+    </cs:fontRef>
+  </cs:dataPoint3D>
+  <cs:dataPointLine>
+    <cs:lnRef idx="0">
+      <cs:styleClr val="auto"/>
+    </cs:lnRef>
+    <cs:fillRef idx="1"/>
+    <cs:effectRef idx="0"/>
+    <cs:fontRef idx="minor">
+      <a:schemeClr val="tx1"/>
+    </cs:fontRef>
+    <cs:spPr>
+      <a:ln w="28575" cap="rnd">
+        <a:solidFill>
+          <a:schemeClr val="phClr"/>
+        </a:solidFill>
+        <a:round/>
+      </a:ln>
+    </cs:spPr>
+  </cs:dataPointLine>
+  <cs:dataPointMarker>
+    <cs:lnRef idx="0">
+      <cs:styleClr val="auto"/>
+    </cs:lnRef>
+    <cs:fillRef idx="1">
+      <cs:styleClr val="auto"/>
+    </cs:fillRef>
+    <cs:effectRef idx="0"/>
+    <cs:fontRef idx="minor">
+      <a:schemeClr val="tx1"/>
+    </cs:fontRef>
+    <cs:spPr>
+      <a:ln w="9525">
+        <a:solidFill>
+          <a:schemeClr val="phClr"/>
+        </a:solidFill>
+      </a:ln>
+    </cs:spPr>
+  </cs:dataPointMarker>
+  <cs:dataPointMarkerLayout symbol="circle" size="5"/>
+  <cs:dataPointWireframe>
+    <cs:lnRef idx="0">
+      <cs:styleClr val="auto"/>
+    </cs:lnRef>
+    <cs:fillRef idx="1"/>
+    <cs:effectRef idx="0"/>
+    <cs:fontRef idx="minor">
+      <a:schemeClr val="tx1"/>
+    </cs:fontRef>
+    <cs:spPr>
+      <a:ln w="9525" cap="rnd">
+        <a:solidFill>
+          <a:schemeClr val="phClr"/>
+        </a:solidFill>
+        <a:round/>
+      </a:ln>
+    </cs:spPr>
+  </cs:dataPointWireframe>
+  <cs:dataTable>
+    <cs:lnRef idx="0"/>
+    <cs:fillRef idx="0"/>
+    <cs:effectRef idx="0"/>
+    <cs:fontRef idx="minor">
+      <a:schemeClr val="tx1">
+        <a:lumMod val="65000"/>
+        <a:lumOff val="35000"/>
+      </a:schemeClr>
+    </cs:fontRef>
+    <cs:spPr>
+      <a:noFill/>
+      <a:ln w="9525" cap="flat" cmpd="sng" algn="ctr">
+        <a:solidFill>
+          <a:schemeClr val="tx1">
+            <a:lumMod val="15000"/>
+            <a:lumOff val="85000"/>
+          </a:schemeClr>
+        </a:solidFill>
+        <a:round/>
+      </a:ln>
+    </cs:spPr>
+    <cs:defRPr sz="900" kern="1200"/>
+  </cs:dataTable>
+  <cs:downBar>
+    <cs:lnRef idx="0"/>
+    <cs:fillRef idx="0"/>
+    <cs:effectRef idx="0"/>
+    <cs:fontRef idx="minor">
+      <a:schemeClr val="dk1"/>
+    </cs:fontRef>
+    <cs:spPr>
+      <a:solidFill>
+        <a:schemeClr val="dk1">
+          <a:lumMod val="65000"/>
+          <a:lumOff val="35000"/>
+        </a:schemeClr>
+      </a:solidFill>
+      <a:ln w="9525">
+        <a:solidFill>
+          <a:schemeClr val="tx1">
+            <a:lumMod val="65000"/>
+            <a:lumOff val="35000"/>
+          </a:schemeClr>
+        </a:solidFill>
+      </a:ln>
+    </cs:spPr>
+  </cs:downBar>
+  <cs:dropLine>
+    <cs:lnRef idx="0"/>
+    <cs:fillRef idx="0"/>
+    <cs:effectRef idx="0"/>
+    <cs:fontRef idx="minor">
+      <a:schemeClr val="tx1"/>
+    </cs:fontRef>
+    <cs:spPr>
+      <a:ln w="9525" cap="flat" cmpd="sng" algn="ctr">
+        <a:solidFill>
+          <a:schemeClr val="tx1">
+            <a:lumMod val="35000"/>
+            <a:lumOff val="65000"/>
+          </a:schemeClr>
+        </a:solidFill>
+        <a:round/>
+      </a:ln>
+    </cs:spPr>
+  </cs:dropLine>
+  <cs:errorBar>
+    <cs:lnRef idx="0"/>
+    <cs:fillRef idx="0"/>
+    <cs:effectRef idx="0"/>
+    <cs:fontRef idx="minor">
+      <a:schemeClr val="tx1"/>
+    </cs:fontRef>
+    <cs:spPr>
+      <a:ln w="9525" cap="flat" cmpd="sng" algn="ctr">
+        <a:solidFill>
+          <a:schemeClr val="tx1">
+            <a:lumMod val="65000"/>
+            <a:lumOff val="35000"/>
+          </a:schemeClr>
+        </a:solidFill>
+        <a:round/>
+      </a:ln>
+    </cs:spPr>
+  </cs:errorBar>
+  <cs:floor>
+    <cs:lnRef idx="0"/>
+    <cs:fillRef idx="0"/>
+    <cs:effectRef idx="0"/>
+    <cs:fontRef idx="minor">
+      <a:schemeClr val="tx1"/>
+    </cs:fontRef>
+    <cs:spPr>
+      <a:noFill/>
+      <a:ln>
+        <a:noFill/>
+      </a:ln>
+    </cs:spPr>
+  </cs:floor>
+  <cs:gridlineMajor>
+    <cs:lnRef idx="0"/>
+    <cs:fillRef idx="0"/>
+    <cs:effectRef idx="0"/>
+    <cs:fontRef idx="minor">
+      <a:schemeClr val="tx1"/>
+    </cs:fontRef>
+    <cs:spPr>
+      <a:ln w="9525" cap="flat" cmpd="sng" algn="ctr">
+        <a:solidFill>
+          <a:schemeClr val="tx1">
+            <a:lumMod val="15000"/>
+            <a:lumOff val="85000"/>
+          </a:schemeClr>
+        </a:solidFill>
+        <a:round/>
+      </a:ln>
+    </cs:spPr>
+  </cs:gridlineMajor>
+  <cs:gridlineMinor>
+    <cs:lnRef idx="0"/>
+    <cs:fillRef idx="0"/>
+    <cs:effectRef idx="0"/>
+    <cs:fontRef idx="minor">
+      <a:schemeClr val="tx1"/>
+    </cs:fontRef>
+    <cs:spPr>
+      <a:ln w="9525" cap="flat" cmpd="sng" algn="ctr">
+        <a:solidFill>
+          <a:schemeClr val="tx1">
+            <a:lumMod val="5000"/>
+            <a:lumOff val="95000"/>
+          </a:schemeClr>
+        </a:solidFill>
+        <a:round/>
+      </a:ln>
+    </cs:spPr>
+  </cs:gridlineMinor>
+  <cs:hiLoLine>
+    <cs:lnRef idx="0"/>
+    <cs:fillRef idx="0"/>
+    <cs:effectRef idx="0"/>
+    <cs:fontRef idx="minor">
+      <a:schemeClr val="tx1"/>
+    </cs:fontRef>
+    <cs:spPr>
+      <a:ln w="9525" cap="flat" cmpd="sng" algn="ctr">
+        <a:solidFill>
+          <a:schemeClr val="tx1">
+            <a:lumMod val="75000"/>
+            <a:lumOff val="25000"/>
+          </a:schemeClr>
+        </a:solidFill>
+        <a:round/>
+      </a:ln>
+    </cs:spPr>
+  </cs:hiLoLine>
+  <cs:leaderLine>
+    <cs:lnRef idx="0"/>
+    <cs:fillRef idx="0"/>
+    <cs:effectRef idx="0"/>
+    <cs:fontRef idx="minor">
+      <a:schemeClr val="tx1"/>
+    </cs:fontRef>
+    <cs:spPr>
+      <a:ln w="9525" cap="flat" cmpd="sng" algn="ctr">
+        <a:solidFill>
+          <a:schemeClr val="tx1">
+            <a:lumMod val="35000"/>
+            <a:lumOff val="65000"/>
+          </a:schemeClr>
+        </a:solidFill>
+        <a:round/>
+      </a:ln>
+    </cs:spPr>
+  </cs:leaderLine>
+  <cs:legend>
+    <cs:lnRef idx="0"/>
+    <cs:fillRef idx="0"/>
+    <cs:effectRef idx="0"/>
+    <cs:fontRef idx="minor">
+      <a:schemeClr val="tx1">
+        <a:lumMod val="65000"/>
+        <a:lumOff val="35000"/>
+      </a:schemeClr>
+    </cs:fontRef>
+    <cs:defRPr sz="900" kern="1200"/>
+  </cs:legend>
+  <cs:plotArea mods="allowNoFillOverride allowNoLineOverride">
+    <cs:lnRef idx="0"/>
+    <cs:fillRef idx="0"/>
+    <cs:effectRef idx="0"/>
+    <cs:fontRef idx="minor">
+      <a:schemeClr val="tx1"/>
+    </cs:fontRef>
+  </cs:plotArea>
+  <cs:plotArea3D mods="allowNoFillOverride allowNoLineOverride">
+    <cs:lnRef idx="0"/>
+    <cs:fillRef idx="0"/>
+    <cs:effectRef idx="0"/>
+    <cs:fontRef idx="minor">
+      <a:schemeClr val="tx1"/>
+    </cs:fontRef>
+  </cs:plotArea3D>
+  <cs:seriesAxis>
+    <cs:lnRef idx="0"/>
+    <cs:fillRef idx="0"/>
+    <cs:effectRef idx="0"/>
+    <cs:fontRef idx="minor">
+      <a:schemeClr val="tx1">
+        <a:lumMod val="65000"/>
+        <a:lumOff val="35000"/>
+      </a:schemeClr>
+    </cs:fontRef>
+    <cs:defRPr sz="900" kern="1200"/>
+  </cs:seriesAxis>
+  <cs:seriesLine>
+    <cs:lnRef idx="0"/>
+    <cs:fillRef idx="0"/>
+    <cs:effectRef idx="0"/>
+    <cs:fontRef idx="minor">
+      <a:schemeClr val="tx1"/>
+    </cs:fontRef>
+    <cs:spPr>
+      <a:ln w="9525" cap="flat" cmpd="sng" algn="ctr">
+        <a:solidFill>
+          <a:schemeClr val="tx1">
+            <a:lumMod val="35000"/>
+            <a:lumOff val="65000"/>
+          </a:schemeClr>
+        </a:solidFill>
+        <a:round/>
+      </a:ln>
+    </cs:spPr>
+  </cs:seriesLine>
+  <cs:title>
+    <cs:lnRef idx="0"/>
+    <cs:fillRef idx="0"/>
+    <cs:effectRef idx="0"/>
+    <cs:fontRef idx="minor">
+      <a:schemeClr val="tx1">
+        <a:lumMod val="65000"/>
+        <a:lumOff val="35000"/>
+      </a:schemeClr>
+    </cs:fontRef>
+    <cs:defRPr sz="1400" b="0" kern="1200" spc="0" baseline="0"/>
+  </cs:title>
+  <cs:trendline>
+    <cs:lnRef idx="0">
+      <cs:styleClr val="auto"/>
+    </cs:lnRef>
+    <cs:fillRef idx="0"/>
+    <cs:effectRef idx="0"/>
+    <cs:fontRef idx="minor">
+      <a:schemeClr val="tx1"/>
+    </cs:fontRef>
+    <cs:spPr>
+      <a:ln w="19050" cap="rnd">
+        <a:solidFill>
+          <a:schemeClr val="phClr"/>
+        </a:solidFill>
+        <a:prstDash val="sysDot"/>
+      </a:ln>
+    </cs:spPr>
+  </cs:trendline>
+  <cs:trendlineLabel>
+    <cs:lnRef idx="0"/>
+    <cs:fillRef idx="0"/>
+    <cs:effectRef idx="0"/>
+    <cs:fontRef idx="minor">
+      <a:schemeClr val="tx1">
+        <a:lumMod val="65000"/>
+        <a:lumOff val="35000"/>
+      </a:schemeClr>
+    </cs:fontRef>
+    <cs:defRPr sz="900" kern="1200"/>
+  </cs:trendlineLabel>
+  <cs:upBar>
+    <cs:lnRef idx="0"/>
+    <cs:fillRef idx="0"/>
+    <cs:effectRef idx="0"/>
+    <cs:fontRef idx="minor">
+      <a:schemeClr val="dk1"/>
+    </cs:fontRef>
+    <cs:spPr>
+      <a:solidFill>
+        <a:schemeClr val="lt1"/>
+      </a:solidFill>
+      <a:ln w="9525">
+        <a:solidFill>
+          <a:schemeClr val="tx1">
+            <a:lumMod val="15000"/>
+            <a:lumOff val="85000"/>
+          </a:schemeClr>
+        </a:solidFill>
+      </a:ln>
+    </cs:spPr>
+  </cs:upBar>
+  <cs:valueAxis>
+    <cs:lnRef idx="0"/>
+    <cs:fillRef idx="0"/>
+    <cs:effectRef idx="0"/>
+    <cs:fontRef idx="minor">
+      <a:schemeClr val="tx1">
+        <a:lumMod val="65000"/>
+        <a:lumOff val="35000"/>
+      </a:schemeClr>
+    </cs:fontRef>
+    <cs:defRPr sz="900" kern="1200"/>
+  </cs:valueAxis>
+  <cs:wall>
+    <cs:lnRef idx="0"/>
+    <cs:fillRef idx="0"/>
+    <cs:effectRef idx="0"/>
+    <cs:fontRef idx="minor">
+      <a:schemeClr val="tx1"/>
+    </cs:fontRef>
+    <cs:spPr>
+      <a:noFill/>
+      <a:ln>
+        <a:noFill/>
+      </a:ln>
+    </cs:spPr>
+  </cs:wall>
+</cs:chartStyle>
+</file>
+
+<file path=ppt/charts/style5.xml><?xml version="1.0" encoding="utf-8"?>
 <cs:chartStyle xmlns:cs="http://schemas.microsoft.com/office/drawing/2012/chartStyle" xmlns:a="http://schemas.openxmlformats.org/drawingml/2006/main" id="201">
   <cs:axisTitle>
     <cs:lnRef idx="0"/>
@@ -9390,7 +11325,7 @@
           <a:p>
             <a:fld id="{2CF913E4-21D6-454A-9B7B-BE459B1334D7}" type="datetimeFigureOut">
               <a:rPr lang="en-US" smtClean="0"/>
-              <a:t>3/14/17</a:t>
+              <a:t>3/17/17</a:t>
             </a:fld>
             <a:endParaRPr lang="en-US"/>
           </a:p>
@@ -10747,7 +12682,7 @@
           <a:p>
             <a:fld id="{E244C58A-5871-1749-BADD-ABDAF70FC583}" type="datetimeFigureOut">
               <a:rPr lang="en-US" smtClean="0"/>
-              <a:t>3/14/17</a:t>
+              <a:t>3/17/17</a:t>
             </a:fld>
             <a:endParaRPr lang="en-US"/>
           </a:p>
@@ -11009,7 +12944,7 @@
           <a:p>
             <a:fld id="{E244C58A-5871-1749-BADD-ABDAF70FC583}" type="datetimeFigureOut">
               <a:rPr lang="en-US" smtClean="0"/>
-              <a:t>3/14/17</a:t>
+              <a:t>3/17/17</a:t>
             </a:fld>
             <a:endParaRPr lang="en-US"/>
           </a:p>
@@ -11235,7 +13170,7 @@
           <a:p>
             <a:fld id="{E244C58A-5871-1749-BADD-ABDAF70FC583}" type="datetimeFigureOut">
               <a:rPr lang="en-US" smtClean="0"/>
-              <a:t>3/14/17</a:t>
+              <a:t>3/17/17</a:t>
             </a:fld>
             <a:endParaRPr lang="en-US"/>
           </a:p>
@@ -11540,7 +13475,7 @@
           <a:p>
             <a:fld id="{E244C58A-5871-1749-BADD-ABDAF70FC583}" type="datetimeFigureOut">
               <a:rPr lang="en-US" smtClean="0"/>
-              <a:t>3/14/17</a:t>
+              <a:t>3/17/17</a:t>
             </a:fld>
             <a:endParaRPr lang="en-US"/>
           </a:p>
@@ -12008,7 +13943,7 @@
           <a:p>
             <a:fld id="{E244C58A-5871-1749-BADD-ABDAF70FC583}" type="datetimeFigureOut">
               <a:rPr lang="en-US" smtClean="0"/>
-              <a:t>3/14/17</a:t>
+              <a:t>3/17/17</a:t>
             </a:fld>
             <a:endParaRPr lang="en-US"/>
           </a:p>
@@ -12550,7 +14485,7 @@
           <a:p>
             <a:fld id="{E244C58A-5871-1749-BADD-ABDAF70FC583}" type="datetimeFigureOut">
               <a:rPr lang="en-US" smtClean="0"/>
-              <a:t>3/14/17</a:t>
+              <a:t>3/17/17</a:t>
             </a:fld>
             <a:endParaRPr lang="en-US"/>
           </a:p>
@@ -13319,7 +15254,7 @@
           <a:p>
             <a:fld id="{E244C58A-5871-1749-BADD-ABDAF70FC583}" type="datetimeFigureOut">
               <a:rPr lang="en-US" smtClean="0"/>
-              <a:t>3/14/17</a:t>
+              <a:t>3/17/17</a:t>
             </a:fld>
             <a:endParaRPr lang="en-US"/>
           </a:p>
@@ -13489,7 +15424,7 @@
           <a:p>
             <a:fld id="{E244C58A-5871-1749-BADD-ABDAF70FC583}" type="datetimeFigureOut">
               <a:rPr lang="en-US" smtClean="0"/>
-              <a:t>3/14/17</a:t>
+              <a:t>3/17/17</a:t>
             </a:fld>
             <a:endParaRPr lang="en-US"/>
           </a:p>
@@ -13707,7 +15642,7 @@
           <a:p>
             <a:fld id="{E244C58A-5871-1749-BADD-ABDAF70FC583}" type="datetimeFigureOut">
               <a:rPr lang="en-US" smtClean="0"/>
-              <a:t>3/14/17</a:t>
+              <a:t>3/17/17</a:t>
             </a:fld>
             <a:endParaRPr lang="en-US"/>
           </a:p>
@@ -13882,7 +15817,7 @@
           <a:p>
             <a:fld id="{E244C58A-5871-1749-BADD-ABDAF70FC583}" type="datetimeFigureOut">
               <a:rPr lang="en-US" smtClean="0"/>
-              <a:t>3/14/17</a:t>
+              <a:t>3/17/17</a:t>
             </a:fld>
             <a:endParaRPr lang="en-US"/>
           </a:p>
@@ -14166,7 +16101,7 @@
           <a:p>
             <a:fld id="{E244C58A-5871-1749-BADD-ABDAF70FC583}" type="datetimeFigureOut">
               <a:rPr lang="en-US" smtClean="0"/>
-              <a:t>3/14/17</a:t>
+              <a:t>3/17/17</a:t>
             </a:fld>
             <a:endParaRPr lang="en-US"/>
           </a:p>
@@ -14403,7 +16338,7 @@
           <a:p>
             <a:fld id="{E244C58A-5871-1749-BADD-ABDAF70FC583}" type="datetimeFigureOut">
               <a:rPr lang="en-US" smtClean="0"/>
-              <a:t>3/14/17</a:t>
+              <a:t>3/17/17</a:t>
             </a:fld>
             <a:endParaRPr lang="en-US"/>
           </a:p>
@@ -14777,7 +16712,7 @@
           <a:p>
             <a:fld id="{E244C58A-5871-1749-BADD-ABDAF70FC583}" type="datetimeFigureOut">
               <a:rPr lang="en-US" smtClean="0"/>
-              <a:t>3/14/17</a:t>
+              <a:t>3/17/17</a:t>
             </a:fld>
             <a:endParaRPr lang="en-US"/>
           </a:p>
@@ -14890,7 +16825,7 @@
           <a:p>
             <a:fld id="{E244C58A-5871-1749-BADD-ABDAF70FC583}" type="datetimeFigureOut">
               <a:rPr lang="en-US" smtClean="0"/>
-              <a:t>3/14/17</a:t>
+              <a:t>3/17/17</a:t>
             </a:fld>
             <a:endParaRPr lang="en-US"/>
           </a:p>
@@ -14980,7 +16915,7 @@
           <a:p>
             <a:fld id="{E244C58A-5871-1749-BADD-ABDAF70FC583}" type="datetimeFigureOut">
               <a:rPr lang="en-US" smtClean="0"/>
-              <a:t>3/14/17</a:t>
+              <a:t>3/17/17</a:t>
             </a:fld>
             <a:endParaRPr lang="en-US"/>
           </a:p>
@@ -15224,7 +17159,7 @@
           <a:p>
             <a:fld id="{E244C58A-5871-1749-BADD-ABDAF70FC583}" type="datetimeFigureOut">
               <a:rPr lang="en-US" smtClean="0"/>
-              <a:t>3/14/17</a:t>
+              <a:t>3/17/17</a:t>
             </a:fld>
             <a:endParaRPr lang="en-US"/>
           </a:p>
@@ -15476,7 +17411,7 @@
           <a:p>
             <a:fld id="{E244C58A-5871-1749-BADD-ABDAF70FC583}" type="datetimeFigureOut">
               <a:rPr lang="en-US" smtClean="0"/>
-              <a:t>3/14/17</a:t>
+              <a:t>3/17/17</a:t>
             </a:fld>
             <a:endParaRPr lang="en-US"/>
           </a:p>
@@ -15714,7 +17649,7 @@
           <a:p>
             <a:fld id="{E244C58A-5871-1749-BADD-ABDAF70FC583}" type="datetimeFigureOut">
               <a:rPr lang="en-US" smtClean="0"/>
-              <a:t>3/14/17</a:t>
+              <a:t>3/17/17</a:t>
             </a:fld>
             <a:endParaRPr lang="en-US"/>
           </a:p>
@@ -16280,11 +18215,7 @@
             </a:r>
             <a:r>
               <a:rPr lang="en-GB" dirty="0" smtClean="0"/>
-              <a:t>comparable with the one’s from bigger (N vs n, N &gt;&gt; n </a:t>
-            </a:r>
-            <a:r>
-              <a:rPr lang="en-GB" dirty="0" smtClean="0"/>
-              <a:t>)</a:t>
+              <a:t>comparable with the one’s from bigger (N vs n, N &gt;&gt; n )</a:t>
             </a:r>
             <a:endParaRPr lang="en-GB" dirty="0"/>
           </a:p>
@@ -16332,10 +18263,125 @@
   <p:clrMapOvr>
     <a:masterClrMapping/>
   </p:clrMapOvr>
+  <p:timing>
+    <p:tnLst>
+      <p:par>
+        <p:cTn id="1" dur="indefinite" restart="never" nodeType="tmRoot"/>
+      </p:par>
+    </p:tnLst>
+  </p:timing>
 </p:sld>
 </file>
 
 <file path=ppt/slides/slide11.xml><?xml version="1.0" encoding="utf-8"?>
+<p:sld xmlns:a="http://schemas.openxmlformats.org/drawingml/2006/main" xmlns:r="http://schemas.openxmlformats.org/officeDocument/2006/relationships" xmlns:p="http://schemas.openxmlformats.org/presentationml/2006/main">
+  <p:cSld>
+    <p:spTree>
+      <p:nvGrpSpPr>
+        <p:cNvPr id="1" name=""/>
+        <p:cNvGrpSpPr/>
+        <p:nvPr/>
+      </p:nvGrpSpPr>
+      <p:grpSpPr>
+        <a:xfrm>
+          <a:off x="0" y="0"/>
+          <a:ext cx="0" cy="0"/>
+          <a:chOff x="0" y="0"/>
+          <a:chExt cx="0" cy="0"/>
+        </a:xfrm>
+      </p:grpSpPr>
+      <p:sp>
+        <p:nvSpPr>
+          <p:cNvPr id="2" name="Title 1"/>
+          <p:cNvSpPr>
+            <a:spLocks noGrp="1"/>
+          </p:cNvSpPr>
+          <p:nvPr>
+            <p:ph type="title"/>
+          </p:nvPr>
+        </p:nvSpPr>
+        <p:spPr/>
+        <p:txBody>
+          <a:bodyPr/>
+          <a:lstStyle/>
+          <a:p>
+            <a:r>
+              <a:rPr lang="en-US" dirty="0" smtClean="0"/>
+              <a:t>Comparisons of the bests</a:t>
+            </a:r>
+            <a:endParaRPr lang="en-US" dirty="0"/>
+          </a:p>
+        </p:txBody>
+      </p:sp>
+      <p:graphicFrame>
+        <p:nvGraphicFramePr>
+          <p:cNvPr id="34" name="Chart 33"/>
+          <p:cNvGraphicFramePr>
+            <a:graphicFrameLocks/>
+          </p:cNvGraphicFramePr>
+          <p:nvPr>
+            <p:extLst>
+              <p:ext uri="{D42A27DB-BD31-4B8C-83A1-F6EECF244321}">
+                <p14:modId xmlns:p14="http://schemas.microsoft.com/office/powerpoint/2010/main" val="1504530051"/>
+              </p:ext>
+            </p:extLst>
+          </p:nvPr>
+        </p:nvGraphicFramePr>
+        <p:xfrm>
+          <a:off x="775703" y="2057401"/>
+          <a:ext cx="5346700" cy="4419600"/>
+        </p:xfrm>
+        <a:graphic>
+          <a:graphicData uri="http://schemas.openxmlformats.org/drawingml/2006/chart">
+            <c:chart xmlns:c="http://schemas.openxmlformats.org/drawingml/2006/chart" xmlns:r="http://schemas.openxmlformats.org/officeDocument/2006/relationships" r:id="rId2"/>
+          </a:graphicData>
+        </a:graphic>
+      </p:graphicFrame>
+      <p:graphicFrame>
+        <p:nvGraphicFramePr>
+          <p:cNvPr id="35" name="Chart 34"/>
+          <p:cNvGraphicFramePr>
+            <a:graphicFrameLocks/>
+          </p:cNvGraphicFramePr>
+          <p:nvPr>
+            <p:extLst>
+              <p:ext uri="{D42A27DB-BD31-4B8C-83A1-F6EECF244321}">
+                <p14:modId xmlns:p14="http://schemas.microsoft.com/office/powerpoint/2010/main" val="1370785770"/>
+              </p:ext>
+            </p:extLst>
+          </p:nvPr>
+        </p:nvGraphicFramePr>
+        <p:xfrm>
+          <a:off x="6934200" y="2057401"/>
+          <a:ext cx="4572000" cy="4271210"/>
+        </p:xfrm>
+        <a:graphic>
+          <a:graphicData uri="http://schemas.openxmlformats.org/drawingml/2006/chart">
+            <c:chart xmlns:c="http://schemas.openxmlformats.org/drawingml/2006/chart" xmlns:r="http://schemas.openxmlformats.org/officeDocument/2006/relationships" r:id="rId3"/>
+          </a:graphicData>
+        </a:graphic>
+      </p:graphicFrame>
+    </p:spTree>
+    <p:extLst>
+      <p:ext uri="{BB962C8B-B14F-4D97-AF65-F5344CB8AC3E}">
+        <p14:creationId xmlns:p14="http://schemas.microsoft.com/office/powerpoint/2010/main" val="729829273"/>
+      </p:ext>
+    </p:extLst>
+  </p:cSld>
+  <p:clrMapOvr>
+    <a:masterClrMapping/>
+  </p:clrMapOvr>
+  <p:timing>
+    <p:tnLst>
+      <p:par>
+        <p:cTn id="1" dur="indefinite" restart="never" nodeType="tmRoot"/>
+      </p:par>
+    </p:tnLst>
+  </p:timing>
+</p:sld>
+</file>
+
+<file path=ppt/slides/slide12.xml><?xml version="1.0" encoding="utf-8"?>
 <p:sld xmlns:a="http://schemas.openxmlformats.org/drawingml/2006/main" xmlns:r="http://schemas.openxmlformats.org/officeDocument/2006/relationships" xmlns:p="http://schemas.openxmlformats.org/presentationml/2006/main">
   <p:cSld>
     <p:spTree>
@@ -17669,7 +19715,7 @@
           <p:nvPr>
             <p:extLst>
               <p:ext uri="{D42A27DB-BD31-4B8C-83A1-F6EECF244321}">
-                <p14:modId xmlns:p14="http://schemas.microsoft.com/office/powerpoint/2010/main" val="1045041905"/>
+                <p14:modId xmlns:p14="http://schemas.microsoft.com/office/powerpoint/2010/main" val="1337287175"/>
               </p:ext>
             </p:extLst>
           </p:nvPr>
@@ -17742,6 +19788,13 @@
   <p:clrMapOvr>
     <a:masterClrMapping/>
   </p:clrMapOvr>
+  <p:timing>
+    <p:tnLst>
+      <p:par>
+        <p:cTn id="1" dur="indefinite" restart="never" nodeType="tmRoot"/>
+      </p:par>
+    </p:tnLst>
+  </p:timing>
 </p:sld>
 </file>
 

</xml_diff>

<commit_message>
first simulation of betting, adding one of the best paper on Poisson
Signed-off-by: Simone90SSL <simone_ro@hotmail.it>
</commit_message>
<xml_diff>
--- a/TODO/spa_presentation.pptx
+++ b/TODO/spa_presentation.pptx
@@ -5,7 +5,7 @@
     <p:sldMasterId id="2147483713" r:id="rId1"/>
   </p:sldMasterIdLst>
   <p:notesMasterIdLst>
-    <p:notesMasterId r:id="rId14"/>
+    <p:notesMasterId r:id="rId15"/>
   </p:notesMasterIdLst>
   <p:sldIdLst>
     <p:sldId id="256" r:id="rId2"/>
@@ -19,7 +19,8 @@
     <p:sldId id="265" r:id="rId10"/>
     <p:sldId id="266" r:id="rId11"/>
     <p:sldId id="267" r:id="rId12"/>
-    <p:sldId id="263" r:id="rId13"/>
+    <p:sldId id="268" r:id="rId13"/>
+    <p:sldId id="263" r:id="rId14"/>
   </p:sldIdLst>
   <p:sldSz cx="12192000" cy="6858000"/>
   <p:notesSz cx="6858000" cy="9144000"/>
@@ -18414,6 +18415,173 @@
           <a:lstStyle/>
           <a:p>
             <a:r>
+              <a:rPr lang="en-US" dirty="0"/>
+              <a:t>	</a:t>
+            </a:r>
+            <a:r>
+              <a:rPr lang="en-US" dirty="0" smtClean="0"/>
+              <a:t>	</a:t>
+            </a:r>
+            <a:endParaRPr lang="en-US" dirty="0"/>
+          </a:p>
+        </p:txBody>
+      </p:sp>
+      <p:sp>
+        <p:nvSpPr>
+          <p:cNvPr id="3" name="Content Placeholder 2"/>
+          <p:cNvSpPr>
+            <a:spLocks noGrp="1"/>
+          </p:cNvSpPr>
+          <p:nvPr>
+            <p:ph idx="1"/>
+          </p:nvPr>
+        </p:nvSpPr>
+        <p:spPr/>
+        <p:txBody>
+          <a:bodyPr/>
+          <a:lstStyle/>
+          <a:p>
+            <a:r>
+              <a:rPr lang="en-US" dirty="0" smtClean="0"/>
+              <a:t>Input: “Team Form”, Representation: 3, </a:t>
+            </a:r>
+            <a:r>
+              <a:rPr lang="en-US" dirty="0" err="1" smtClean="0"/>
+              <a:t>Sklearn</a:t>
+            </a:r>
+            <a:r>
+              <a:rPr lang="en-US" dirty="0" smtClean="0"/>
+              <a:t> SVM</a:t>
+            </a:r>
+          </a:p>
+          <a:p>
+            <a:pPr lvl="1"/>
+            <a:r>
+              <a:rPr lang="en-US" dirty="0" smtClean="0"/>
+              <a:t>[</a:t>
+            </a:r>
+            <a:r>
+              <a:rPr lang="en-US" dirty="0" err="1" smtClean="0"/>
+              <a:t>home_form</a:t>
+            </a:r>
+            <a:r>
+              <a:rPr lang="en-US" dirty="0" smtClean="0"/>
+              <a:t> </a:t>
+            </a:r>
+            <a:r>
+              <a:rPr lang="en-US" dirty="0"/>
+              <a:t>/ </a:t>
+            </a:r>
+            <a:r>
+              <a:rPr lang="en-US" dirty="0" err="1"/>
+              <a:t>home_n</a:t>
+            </a:r>
+            <a:r>
+              <a:rPr lang="en-US" dirty="0"/>
+              <a:t> - </a:t>
+            </a:r>
+            <a:r>
+              <a:rPr lang="en-US" dirty="0" err="1"/>
+              <a:t>away_form</a:t>
+            </a:r>
+            <a:r>
+              <a:rPr lang="en-US" dirty="0"/>
+              <a:t> / </a:t>
+            </a:r>
+            <a:r>
+              <a:rPr lang="en-US" dirty="0" err="1"/>
+              <a:t>away_n</a:t>
+            </a:r>
+            <a:r>
+              <a:rPr lang="en-US" dirty="0" smtClean="0"/>
+              <a:t>]</a:t>
+            </a:r>
+          </a:p>
+          <a:p>
+            <a:pPr lvl="1"/>
+            <a:r>
+              <a:rPr lang="en-US" i="1" dirty="0" smtClean="0"/>
+              <a:t>form</a:t>
+            </a:r>
+            <a:r>
+              <a:rPr lang="en-US" dirty="0" smtClean="0"/>
+              <a:t>: points gathered in the last </a:t>
+            </a:r>
+            <a:r>
+              <a:rPr lang="en-US" i="1" dirty="0" smtClean="0"/>
+              <a:t>n</a:t>
+            </a:r>
+            <a:r>
+              <a:rPr lang="en-US" dirty="0" smtClean="0"/>
+              <a:t> matches</a:t>
+            </a:r>
+            <a:endParaRPr lang="en-US" dirty="0"/>
+          </a:p>
+          <a:p>
+            <a:endParaRPr lang="en-US" dirty="0"/>
+          </a:p>
+          <a:p>
+            <a:r>
+              <a:rPr lang="en-US" dirty="0" smtClean="0"/>
+              <a:t>Input: “Team strength”, Poisson</a:t>
+            </a:r>
+            <a:endParaRPr lang="en-US" dirty="0"/>
+          </a:p>
+        </p:txBody>
+      </p:sp>
+    </p:spTree>
+    <p:extLst>
+      <p:ext uri="{BB962C8B-B14F-4D97-AF65-F5344CB8AC3E}">
+        <p14:creationId xmlns:p14="http://schemas.microsoft.com/office/powerpoint/2010/main" val="1190349996"/>
+      </p:ext>
+    </p:extLst>
+  </p:cSld>
+  <p:clrMapOvr>
+    <a:masterClrMapping/>
+  </p:clrMapOvr>
+  <p:timing>
+    <p:tnLst>
+      <p:par>
+        <p:cTn id="1" dur="indefinite" restart="never" nodeType="tmRoot"/>
+      </p:par>
+    </p:tnLst>
+  </p:timing>
+</p:sld>
+</file>
+
+<file path=ppt/slides/slide13.xml><?xml version="1.0" encoding="utf-8"?>
+<p:sld xmlns:a="http://schemas.openxmlformats.org/drawingml/2006/main" xmlns:r="http://schemas.openxmlformats.org/officeDocument/2006/relationships" xmlns:p="http://schemas.openxmlformats.org/presentationml/2006/main">
+  <p:cSld>
+    <p:spTree>
+      <p:nvGrpSpPr>
+        <p:cNvPr id="1" name=""/>
+        <p:cNvGrpSpPr/>
+        <p:nvPr/>
+      </p:nvGrpSpPr>
+      <p:grpSpPr>
+        <a:xfrm>
+          <a:off x="0" y="0"/>
+          <a:ext cx="0" cy="0"/>
+          <a:chOff x="0" y="0"/>
+          <a:chExt cx="0" cy="0"/>
+        </a:xfrm>
+      </p:grpSpPr>
+      <p:sp>
+        <p:nvSpPr>
+          <p:cNvPr id="2" name="Title 1"/>
+          <p:cNvSpPr>
+            <a:spLocks noGrp="1"/>
+          </p:cNvSpPr>
+          <p:nvPr>
+            <p:ph type="title"/>
+          </p:nvPr>
+        </p:nvSpPr>
+        <p:spPr/>
+        <p:txBody>
+          <a:bodyPr/>
+          <a:lstStyle/>
+          <a:p>
+            <a:r>
               <a:rPr lang="en-US" dirty="0" smtClean="0"/>
               <a:t>Look at the next match</a:t>
             </a:r>
@@ -18464,6 +18632,13 @@
   <p:clrMapOvr>
     <a:masterClrMapping/>
   </p:clrMapOvr>
+  <p:timing>
+    <p:tnLst>
+      <p:par>
+        <p:cTn id="1" dur="indefinite" restart="never" nodeType="tmRoot"/>
+      </p:par>
+    </p:tnLst>
+  </p:timing>
 </p:sld>
 </file>
 

</xml_diff>